<commit_message>
finished ip api call, starting on processing files
</commit_message>
<xml_diff>
--- a/Flow.pptx
+++ b/Flow.pptx
@@ -105,6 +105,11 @@
       </a:defRPr>
     </a:lvl9pPr>
   </p:defaultTextStyle>
+  <p:extLst>
+    <p:ext uri="{EFAFB233-063F-42B5-8137-9DF3F51BA10A}">
+      <p15:sldGuideLst xmlns:p15="http://schemas.microsoft.com/office/powerpoint/2012/main"/>
+    </p:ext>
+  </p:extLst>
 </p:presentation>
 </file>
 
@@ -870,10 +875,10 @@
         <a:lstStyle/>
         <a:p>
           <a:r>
-            <a:rPr lang="en-US"/>
+            <a:rPr lang="en-US" dirty="0"/>
             <a:t>User uploads file</a:t>
           </a:r>
-          <a:endParaRPr lang="en-SG"/>
+          <a:endParaRPr lang="en-SG" dirty="0"/>
         </a:p>
       </dgm:t>
     </dgm:pt>
@@ -900,12 +905,16 @@
       </dgm:t>
     </dgm:pt>
     <dgm:pt modelId="{9797697C-FB66-4D27-B519-829E06BC6EEF}">
-      <dgm:prSet phldrT="[Text]" phldr="1"/>
+      <dgm:prSet phldrT="[Text]"/>
       <dgm:spPr/>
       <dgm:t>
         <a:bodyPr/>
         <a:lstStyle/>
         <a:p>
+          <a:r>
+            <a:rPr lang="en-US" dirty="0"/>
+            <a:t>Backend receives and saves CSV into queue</a:t>
+          </a:r>
           <a:endParaRPr lang="en-SG" dirty="0"/>
         </a:p>
       </dgm:t>
@@ -966,12 +975,16 @@
       </dgm:t>
     </dgm:pt>
     <dgm:pt modelId="{7EEF927A-C588-4033-B096-82F60784A255}">
-      <dgm:prSet phldrT="[Text]" phldr="1"/>
+      <dgm:prSet phldrT="[Text]"/>
       <dgm:spPr/>
       <dgm:t>
         <a:bodyPr/>
         <a:lstStyle/>
         <a:p>
+          <a:r>
+            <a:rPr lang="en-US"/>
+            <a:t>and processes</a:t>
+          </a:r>
           <a:endParaRPr lang="en-SG"/>
         </a:p>
       </dgm:t>
@@ -1057,7 +1070,7 @@
       <dgm:spPr/>
     </dgm:pt>
     <dgm:pt modelId="{52AE989D-D49D-439B-A237-0EF283D12B0A}" type="pres">
-      <dgm:prSet presAssocID="{9797697C-FB66-4D27-B519-829E06BC6EEF}" presName="node" presStyleLbl="node1" presStyleIdx="1" presStyleCnt="5">
+      <dgm:prSet presAssocID="{9797697C-FB66-4D27-B519-829E06BC6EEF}" presName="node" presStyleLbl="node1" presStyleIdx="1" presStyleCnt="5" custLinFactNeighborX="4645" custLinFactNeighborY="0">
         <dgm:presLayoutVars>
           <dgm:bulletEnabled val="1"/>
         </dgm:presLayoutVars>
@@ -1172,8 +1185,310 @@
       </dsp:nvSpPr>
       <dsp:spPr>
         <a:xfrm>
-          <a:off x="3968" y="2219130"/>
-          <a:ext cx="1230312" cy="980405"/>
+          <a:off x="3968" y="1975831"/>
+          <a:ext cx="1230312" cy="1467003"/>
+        </a:xfrm>
+        <a:prstGeom prst="roundRect">
+          <a:avLst>
+            <a:gd name="adj" fmla="val 10000"/>
+          </a:avLst>
+        </a:prstGeom>
+        <a:solidFill>
+          <a:schemeClr val="accent1">
+            <a:hueOff val="0"/>
+            <a:satOff val="0"/>
+            <a:lumOff val="0"/>
+            <a:alphaOff val="0"/>
+          </a:schemeClr>
+        </a:solidFill>
+        <a:ln w="12700" cap="flat" cmpd="sng" algn="ctr">
+          <a:solidFill>
+            <a:schemeClr val="lt1">
+              <a:hueOff val="0"/>
+              <a:satOff val="0"/>
+              <a:lumOff val="0"/>
+              <a:alphaOff val="0"/>
+            </a:schemeClr>
+          </a:solidFill>
+          <a:prstDash val="solid"/>
+          <a:miter lim="800000"/>
+        </a:ln>
+        <a:effectLst/>
+      </dsp:spPr>
+      <dsp:style>
+        <a:lnRef idx="2">
+          <a:scrgbClr r="0" g="0" b="0"/>
+        </a:lnRef>
+        <a:fillRef idx="1">
+          <a:scrgbClr r="0" g="0" b="0"/>
+        </a:fillRef>
+        <a:effectRef idx="0">
+          <a:scrgbClr r="0" g="0" b="0"/>
+        </a:effectRef>
+        <a:fontRef idx="minor">
+          <a:schemeClr val="lt1"/>
+        </a:fontRef>
+      </dsp:style>
+      <dsp:txBody>
+        <a:bodyPr spcFirstLastPara="0" vert="horz" wrap="square" lIns="68580" tIns="68580" rIns="68580" bIns="68580" numCol="1" spcCol="1270" anchor="ctr" anchorCtr="0">
+          <a:noAutofit/>
+        </a:bodyPr>
+        <a:lstStyle/>
+        <a:p>
+          <a:pPr marL="0" lvl="0" indent="0" algn="ctr" defTabSz="800100">
+            <a:lnSpc>
+              <a:spcPct val="90000"/>
+            </a:lnSpc>
+            <a:spcBef>
+              <a:spcPct val="0"/>
+            </a:spcBef>
+            <a:spcAft>
+              <a:spcPct val="35000"/>
+            </a:spcAft>
+            <a:buNone/>
+          </a:pPr>
+          <a:r>
+            <a:rPr lang="en-US" sz="1800" kern="1200" dirty="0"/>
+            <a:t>User uploads file</a:t>
+          </a:r>
+          <a:endParaRPr lang="en-SG" sz="1800" kern="1200" dirty="0"/>
+        </a:p>
+      </dsp:txBody>
+      <dsp:txXfrm>
+        <a:off x="40003" y="2011866"/>
+        <a:ext cx="1158242" cy="1394933"/>
+      </dsp:txXfrm>
+    </dsp:sp>
+    <dsp:sp modelId="{84572B7C-B943-4B73-8341-7B59ADC20F66}">
+      <dsp:nvSpPr>
+        <dsp:cNvPr id="0" name=""/>
+        <dsp:cNvSpPr/>
+      </dsp:nvSpPr>
+      <dsp:spPr>
+        <a:xfrm>
+          <a:off x="1363027" y="2556774"/>
+          <a:ext cx="272941" cy="305117"/>
+        </a:xfrm>
+        <a:prstGeom prst="rightArrow">
+          <a:avLst>
+            <a:gd name="adj1" fmla="val 60000"/>
+            <a:gd name="adj2" fmla="val 50000"/>
+          </a:avLst>
+        </a:prstGeom>
+        <a:solidFill>
+          <a:schemeClr val="accent1">
+            <a:tint val="60000"/>
+            <a:hueOff val="0"/>
+            <a:satOff val="0"/>
+            <a:lumOff val="0"/>
+            <a:alphaOff val="0"/>
+          </a:schemeClr>
+        </a:solidFill>
+        <a:ln>
+          <a:noFill/>
+        </a:ln>
+        <a:effectLst/>
+      </dsp:spPr>
+      <dsp:style>
+        <a:lnRef idx="0">
+          <a:scrgbClr r="0" g="0" b="0"/>
+        </a:lnRef>
+        <a:fillRef idx="1">
+          <a:scrgbClr r="0" g="0" b="0"/>
+        </a:fillRef>
+        <a:effectRef idx="0">
+          <a:scrgbClr r="0" g="0" b="0"/>
+        </a:effectRef>
+        <a:fontRef idx="minor">
+          <a:schemeClr val="lt1"/>
+        </a:fontRef>
+      </dsp:style>
+      <dsp:txBody>
+        <a:bodyPr spcFirstLastPara="0" vert="horz" wrap="square" lIns="0" tIns="0" rIns="0" bIns="0" numCol="1" spcCol="1270" anchor="ctr" anchorCtr="0">
+          <a:noAutofit/>
+        </a:bodyPr>
+        <a:lstStyle/>
+        <a:p>
+          <a:pPr marL="0" lvl="0" indent="0" algn="ctr" defTabSz="577850">
+            <a:lnSpc>
+              <a:spcPct val="90000"/>
+            </a:lnSpc>
+            <a:spcBef>
+              <a:spcPct val="0"/>
+            </a:spcBef>
+            <a:spcAft>
+              <a:spcPct val="35000"/>
+            </a:spcAft>
+            <a:buNone/>
+          </a:pPr>
+          <a:endParaRPr lang="en-SG" sz="1300" kern="1200"/>
+        </a:p>
+      </dsp:txBody>
+      <dsp:txXfrm>
+        <a:off x="1363027" y="2617797"/>
+        <a:ext cx="191059" cy="183071"/>
+      </dsp:txXfrm>
+    </dsp:sp>
+    <dsp:sp modelId="{52AE989D-D49D-439B-A237-0EF283D12B0A}">
+      <dsp:nvSpPr>
+        <dsp:cNvPr id="0" name=""/>
+        <dsp:cNvSpPr/>
+      </dsp:nvSpPr>
+      <dsp:spPr>
+        <a:xfrm>
+          <a:off x="1749265" y="1975831"/>
+          <a:ext cx="1230312" cy="1467003"/>
+        </a:xfrm>
+        <a:prstGeom prst="roundRect">
+          <a:avLst>
+            <a:gd name="adj" fmla="val 10000"/>
+          </a:avLst>
+        </a:prstGeom>
+        <a:solidFill>
+          <a:schemeClr val="accent1">
+            <a:hueOff val="0"/>
+            <a:satOff val="0"/>
+            <a:lumOff val="0"/>
+            <a:alphaOff val="0"/>
+          </a:schemeClr>
+        </a:solidFill>
+        <a:ln w="12700" cap="flat" cmpd="sng" algn="ctr">
+          <a:solidFill>
+            <a:schemeClr val="lt1">
+              <a:hueOff val="0"/>
+              <a:satOff val="0"/>
+              <a:lumOff val="0"/>
+              <a:alphaOff val="0"/>
+            </a:schemeClr>
+          </a:solidFill>
+          <a:prstDash val="solid"/>
+          <a:miter lim="800000"/>
+        </a:ln>
+        <a:effectLst/>
+      </dsp:spPr>
+      <dsp:style>
+        <a:lnRef idx="2">
+          <a:scrgbClr r="0" g="0" b="0"/>
+        </a:lnRef>
+        <a:fillRef idx="1">
+          <a:scrgbClr r="0" g="0" b="0"/>
+        </a:fillRef>
+        <a:effectRef idx="0">
+          <a:scrgbClr r="0" g="0" b="0"/>
+        </a:effectRef>
+        <a:fontRef idx="minor">
+          <a:schemeClr val="lt1"/>
+        </a:fontRef>
+      </dsp:style>
+      <dsp:txBody>
+        <a:bodyPr spcFirstLastPara="0" vert="horz" wrap="square" lIns="68580" tIns="68580" rIns="68580" bIns="68580" numCol="1" spcCol="1270" anchor="ctr" anchorCtr="0">
+          <a:noAutofit/>
+        </a:bodyPr>
+        <a:lstStyle/>
+        <a:p>
+          <a:pPr marL="0" lvl="0" indent="0" algn="ctr" defTabSz="800100">
+            <a:lnSpc>
+              <a:spcPct val="90000"/>
+            </a:lnSpc>
+            <a:spcBef>
+              <a:spcPct val="0"/>
+            </a:spcBef>
+            <a:spcAft>
+              <a:spcPct val="35000"/>
+            </a:spcAft>
+            <a:buNone/>
+          </a:pPr>
+          <a:r>
+            <a:rPr lang="en-US" sz="1800" kern="1200" dirty="0"/>
+            <a:t>Backend receives and saves CSV into queue</a:t>
+          </a:r>
+          <a:endParaRPr lang="en-SG" sz="1800" kern="1200" dirty="0"/>
+        </a:p>
+      </dsp:txBody>
+      <dsp:txXfrm>
+        <a:off x="1785300" y="2011866"/>
+        <a:ext cx="1158242" cy="1394933"/>
+      </dsp:txXfrm>
+    </dsp:sp>
+    <dsp:sp modelId="{81193323-1490-43C3-A250-B3FD4CF49F56}">
+      <dsp:nvSpPr>
+        <dsp:cNvPr id="0" name=""/>
+        <dsp:cNvSpPr/>
+      </dsp:nvSpPr>
+      <dsp:spPr>
+        <a:xfrm>
+          <a:off x="3096894" y="2556774"/>
+          <a:ext cx="248710" cy="305117"/>
+        </a:xfrm>
+        <a:prstGeom prst="rightArrow">
+          <a:avLst>
+            <a:gd name="adj1" fmla="val 60000"/>
+            <a:gd name="adj2" fmla="val 50000"/>
+          </a:avLst>
+        </a:prstGeom>
+        <a:solidFill>
+          <a:schemeClr val="accent1">
+            <a:tint val="60000"/>
+            <a:hueOff val="0"/>
+            <a:satOff val="0"/>
+            <a:lumOff val="0"/>
+            <a:alphaOff val="0"/>
+          </a:schemeClr>
+        </a:solidFill>
+        <a:ln>
+          <a:noFill/>
+        </a:ln>
+        <a:effectLst/>
+      </dsp:spPr>
+      <dsp:style>
+        <a:lnRef idx="0">
+          <a:scrgbClr r="0" g="0" b="0"/>
+        </a:lnRef>
+        <a:fillRef idx="1">
+          <a:scrgbClr r="0" g="0" b="0"/>
+        </a:fillRef>
+        <a:effectRef idx="0">
+          <a:scrgbClr r="0" g="0" b="0"/>
+        </a:effectRef>
+        <a:fontRef idx="minor">
+          <a:schemeClr val="lt1"/>
+        </a:fontRef>
+      </dsp:style>
+      <dsp:txBody>
+        <a:bodyPr spcFirstLastPara="0" vert="horz" wrap="square" lIns="0" tIns="0" rIns="0" bIns="0" numCol="1" spcCol="1270" anchor="ctr" anchorCtr="0">
+          <a:noAutofit/>
+        </a:bodyPr>
+        <a:lstStyle/>
+        <a:p>
+          <a:pPr marL="0" lvl="0" indent="0" algn="ctr" defTabSz="577850">
+            <a:lnSpc>
+              <a:spcPct val="90000"/>
+            </a:lnSpc>
+            <a:spcBef>
+              <a:spcPct val="0"/>
+            </a:spcBef>
+            <a:spcAft>
+              <a:spcPct val="35000"/>
+            </a:spcAft>
+            <a:buNone/>
+          </a:pPr>
+          <a:endParaRPr lang="en-SG" sz="1300" kern="1200"/>
+        </a:p>
+      </dsp:txBody>
+      <dsp:txXfrm>
+        <a:off x="3096894" y="2617797"/>
+        <a:ext cx="174097" cy="183071"/>
+      </dsp:txXfrm>
+    </dsp:sp>
+    <dsp:sp modelId="{9E6150FE-12DC-40C0-980E-51C8CE24ABA0}">
+      <dsp:nvSpPr>
+        <dsp:cNvPr id="0" name=""/>
+        <dsp:cNvSpPr/>
+      </dsp:nvSpPr>
+      <dsp:spPr>
+        <a:xfrm>
+          <a:off x="3448843" y="1975831"/>
+          <a:ext cx="1230312" cy="1467003"/>
         </a:xfrm>
         <a:prstGeom prst="roundRect">
           <a:avLst>
@@ -1236,308 +1551,14 @@
           </a:pPr>
           <a:r>
             <a:rPr lang="en-US" sz="1800" kern="1200"/>
-            <a:t>User uploads file</a:t>
+            <a:t>and processes</a:t>
           </a:r>
           <a:endParaRPr lang="en-SG" sz="1800" kern="1200"/>
         </a:p>
       </dsp:txBody>
       <dsp:txXfrm>
-        <a:off x="32683" y="2247845"/>
-        <a:ext cx="1172882" cy="922975"/>
-      </dsp:txXfrm>
-    </dsp:sp>
-    <dsp:sp modelId="{84572B7C-B943-4B73-8341-7B59ADC20F66}">
-      <dsp:nvSpPr>
-        <dsp:cNvPr id="0" name=""/>
-        <dsp:cNvSpPr/>
-      </dsp:nvSpPr>
-      <dsp:spPr>
-        <a:xfrm>
-          <a:off x="1357312" y="2556774"/>
-          <a:ext cx="260826" cy="305117"/>
-        </a:xfrm>
-        <a:prstGeom prst="rightArrow">
-          <a:avLst>
-            <a:gd name="adj1" fmla="val 60000"/>
-            <a:gd name="adj2" fmla="val 50000"/>
-          </a:avLst>
-        </a:prstGeom>
-        <a:solidFill>
-          <a:schemeClr val="accent1">
-            <a:tint val="60000"/>
-            <a:hueOff val="0"/>
-            <a:satOff val="0"/>
-            <a:lumOff val="0"/>
-            <a:alphaOff val="0"/>
-          </a:schemeClr>
-        </a:solidFill>
-        <a:ln>
-          <a:noFill/>
-        </a:ln>
-        <a:effectLst/>
-      </dsp:spPr>
-      <dsp:style>
-        <a:lnRef idx="0">
-          <a:scrgbClr r="0" g="0" b="0"/>
-        </a:lnRef>
-        <a:fillRef idx="1">
-          <a:scrgbClr r="0" g="0" b="0"/>
-        </a:fillRef>
-        <a:effectRef idx="0">
-          <a:scrgbClr r="0" g="0" b="0"/>
-        </a:effectRef>
-        <a:fontRef idx="minor">
-          <a:schemeClr val="lt1"/>
-        </a:fontRef>
-      </dsp:style>
-      <dsp:txBody>
-        <a:bodyPr spcFirstLastPara="0" vert="horz" wrap="square" lIns="0" tIns="0" rIns="0" bIns="0" numCol="1" spcCol="1270" anchor="ctr" anchorCtr="0">
-          <a:noAutofit/>
-        </a:bodyPr>
-        <a:lstStyle/>
-        <a:p>
-          <a:pPr marL="0" lvl="0" indent="0" algn="ctr" defTabSz="577850">
-            <a:lnSpc>
-              <a:spcPct val="90000"/>
-            </a:lnSpc>
-            <a:spcBef>
-              <a:spcPct val="0"/>
-            </a:spcBef>
-            <a:spcAft>
-              <a:spcPct val="35000"/>
-            </a:spcAft>
-            <a:buNone/>
-          </a:pPr>
-          <a:endParaRPr lang="en-SG" sz="1300" kern="1200"/>
-        </a:p>
-      </dsp:txBody>
-      <dsp:txXfrm>
-        <a:off x="1357312" y="2617797"/>
-        <a:ext cx="182578" cy="183071"/>
-      </dsp:txXfrm>
-    </dsp:sp>
-    <dsp:sp modelId="{52AE989D-D49D-439B-A237-0EF283D12B0A}">
-      <dsp:nvSpPr>
-        <dsp:cNvPr id="0" name=""/>
-        <dsp:cNvSpPr/>
-      </dsp:nvSpPr>
-      <dsp:spPr>
-        <a:xfrm>
-          <a:off x="1726406" y="2219130"/>
-          <a:ext cx="1230312" cy="980405"/>
-        </a:xfrm>
-        <a:prstGeom prst="roundRect">
-          <a:avLst>
-            <a:gd name="adj" fmla="val 10000"/>
-          </a:avLst>
-        </a:prstGeom>
-        <a:solidFill>
-          <a:schemeClr val="accent1">
-            <a:hueOff val="0"/>
-            <a:satOff val="0"/>
-            <a:lumOff val="0"/>
-            <a:alphaOff val="0"/>
-          </a:schemeClr>
-        </a:solidFill>
-        <a:ln w="12700" cap="flat" cmpd="sng" algn="ctr">
-          <a:solidFill>
-            <a:schemeClr val="lt1">
-              <a:hueOff val="0"/>
-              <a:satOff val="0"/>
-              <a:lumOff val="0"/>
-              <a:alphaOff val="0"/>
-            </a:schemeClr>
-          </a:solidFill>
-          <a:prstDash val="solid"/>
-          <a:miter lim="800000"/>
-        </a:ln>
-        <a:effectLst/>
-      </dsp:spPr>
-      <dsp:style>
-        <a:lnRef idx="2">
-          <a:scrgbClr r="0" g="0" b="0"/>
-        </a:lnRef>
-        <a:fillRef idx="1">
-          <a:scrgbClr r="0" g="0" b="0"/>
-        </a:fillRef>
-        <a:effectRef idx="0">
-          <a:scrgbClr r="0" g="0" b="0"/>
-        </a:effectRef>
-        <a:fontRef idx="minor">
-          <a:schemeClr val="lt1"/>
-        </a:fontRef>
-      </dsp:style>
-      <dsp:txBody>
-        <a:bodyPr spcFirstLastPara="0" vert="horz" wrap="square" lIns="68580" tIns="68580" rIns="68580" bIns="68580" numCol="1" spcCol="1270" anchor="ctr" anchorCtr="0">
-          <a:noAutofit/>
-        </a:bodyPr>
-        <a:lstStyle/>
-        <a:p>
-          <a:pPr marL="0" lvl="0" indent="0" algn="ctr" defTabSz="800100">
-            <a:lnSpc>
-              <a:spcPct val="90000"/>
-            </a:lnSpc>
-            <a:spcBef>
-              <a:spcPct val="0"/>
-            </a:spcBef>
-            <a:spcAft>
-              <a:spcPct val="35000"/>
-            </a:spcAft>
-            <a:buNone/>
-          </a:pPr>
-          <a:endParaRPr lang="en-SG" sz="1800" kern="1200" dirty="0"/>
-        </a:p>
-      </dsp:txBody>
-      <dsp:txXfrm>
-        <a:off x="1755121" y="2247845"/>
-        <a:ext cx="1172882" cy="922975"/>
-      </dsp:txXfrm>
-    </dsp:sp>
-    <dsp:sp modelId="{81193323-1490-43C3-A250-B3FD4CF49F56}">
-      <dsp:nvSpPr>
-        <dsp:cNvPr id="0" name=""/>
-        <dsp:cNvSpPr/>
-      </dsp:nvSpPr>
-      <dsp:spPr>
-        <a:xfrm>
-          <a:off x="3079750" y="2556774"/>
-          <a:ext cx="260826" cy="305117"/>
-        </a:xfrm>
-        <a:prstGeom prst="rightArrow">
-          <a:avLst>
-            <a:gd name="adj1" fmla="val 60000"/>
-            <a:gd name="adj2" fmla="val 50000"/>
-          </a:avLst>
-        </a:prstGeom>
-        <a:solidFill>
-          <a:schemeClr val="accent1">
-            <a:tint val="60000"/>
-            <a:hueOff val="0"/>
-            <a:satOff val="0"/>
-            <a:lumOff val="0"/>
-            <a:alphaOff val="0"/>
-          </a:schemeClr>
-        </a:solidFill>
-        <a:ln>
-          <a:noFill/>
-        </a:ln>
-        <a:effectLst/>
-      </dsp:spPr>
-      <dsp:style>
-        <a:lnRef idx="0">
-          <a:scrgbClr r="0" g="0" b="0"/>
-        </a:lnRef>
-        <a:fillRef idx="1">
-          <a:scrgbClr r="0" g="0" b="0"/>
-        </a:fillRef>
-        <a:effectRef idx="0">
-          <a:scrgbClr r="0" g="0" b="0"/>
-        </a:effectRef>
-        <a:fontRef idx="minor">
-          <a:schemeClr val="lt1"/>
-        </a:fontRef>
-      </dsp:style>
-      <dsp:txBody>
-        <a:bodyPr spcFirstLastPara="0" vert="horz" wrap="square" lIns="0" tIns="0" rIns="0" bIns="0" numCol="1" spcCol="1270" anchor="ctr" anchorCtr="0">
-          <a:noAutofit/>
-        </a:bodyPr>
-        <a:lstStyle/>
-        <a:p>
-          <a:pPr marL="0" lvl="0" indent="0" algn="ctr" defTabSz="577850">
-            <a:lnSpc>
-              <a:spcPct val="90000"/>
-            </a:lnSpc>
-            <a:spcBef>
-              <a:spcPct val="0"/>
-            </a:spcBef>
-            <a:spcAft>
-              <a:spcPct val="35000"/>
-            </a:spcAft>
-            <a:buNone/>
-          </a:pPr>
-          <a:endParaRPr lang="en-SG" sz="1300" kern="1200"/>
-        </a:p>
-      </dsp:txBody>
-      <dsp:txXfrm>
-        <a:off x="3079750" y="2617797"/>
-        <a:ext cx="182578" cy="183071"/>
-      </dsp:txXfrm>
-    </dsp:sp>
-    <dsp:sp modelId="{9E6150FE-12DC-40C0-980E-51C8CE24ABA0}">
-      <dsp:nvSpPr>
-        <dsp:cNvPr id="0" name=""/>
-        <dsp:cNvSpPr/>
-      </dsp:nvSpPr>
-      <dsp:spPr>
-        <a:xfrm>
-          <a:off x="3448843" y="2219130"/>
-          <a:ext cx="1230312" cy="980405"/>
-        </a:xfrm>
-        <a:prstGeom prst="roundRect">
-          <a:avLst>
-            <a:gd name="adj" fmla="val 10000"/>
-          </a:avLst>
-        </a:prstGeom>
-        <a:solidFill>
-          <a:schemeClr val="accent1">
-            <a:hueOff val="0"/>
-            <a:satOff val="0"/>
-            <a:lumOff val="0"/>
-            <a:alphaOff val="0"/>
-          </a:schemeClr>
-        </a:solidFill>
-        <a:ln w="12700" cap="flat" cmpd="sng" algn="ctr">
-          <a:solidFill>
-            <a:schemeClr val="lt1">
-              <a:hueOff val="0"/>
-              <a:satOff val="0"/>
-              <a:lumOff val="0"/>
-              <a:alphaOff val="0"/>
-            </a:schemeClr>
-          </a:solidFill>
-          <a:prstDash val="solid"/>
-          <a:miter lim="800000"/>
-        </a:ln>
-        <a:effectLst/>
-      </dsp:spPr>
-      <dsp:style>
-        <a:lnRef idx="2">
-          <a:scrgbClr r="0" g="0" b="0"/>
-        </a:lnRef>
-        <a:fillRef idx="1">
-          <a:scrgbClr r="0" g="0" b="0"/>
-        </a:fillRef>
-        <a:effectRef idx="0">
-          <a:scrgbClr r="0" g="0" b="0"/>
-        </a:effectRef>
-        <a:fontRef idx="minor">
-          <a:schemeClr val="lt1"/>
-        </a:fontRef>
-      </dsp:style>
-      <dsp:txBody>
-        <a:bodyPr spcFirstLastPara="0" vert="horz" wrap="square" lIns="68580" tIns="68580" rIns="68580" bIns="68580" numCol="1" spcCol="1270" anchor="ctr" anchorCtr="0">
-          <a:noAutofit/>
-        </a:bodyPr>
-        <a:lstStyle/>
-        <a:p>
-          <a:pPr marL="0" lvl="0" indent="0" algn="ctr" defTabSz="800100">
-            <a:lnSpc>
-              <a:spcPct val="90000"/>
-            </a:lnSpc>
-            <a:spcBef>
-              <a:spcPct val="0"/>
-            </a:spcBef>
-            <a:spcAft>
-              <a:spcPct val="35000"/>
-            </a:spcAft>
-            <a:buNone/>
-          </a:pPr>
-          <a:endParaRPr lang="en-SG" sz="1800" kern="1200"/>
-        </a:p>
-      </dsp:txBody>
-      <dsp:txXfrm>
-        <a:off x="3477558" y="2247845"/>
-        <a:ext cx="1172882" cy="922975"/>
+        <a:off x="3484878" y="2011866"/>
+        <a:ext cx="1158242" cy="1394933"/>
       </dsp:txXfrm>
     </dsp:sp>
     <dsp:sp modelId="{877B6B1C-3AE2-4AAD-91B6-F7BB1F9CE3A8}">
@@ -1617,8 +1638,8 @@
       </dsp:nvSpPr>
       <dsp:spPr>
         <a:xfrm>
-          <a:off x="5171281" y="2219130"/>
-          <a:ext cx="1230312" cy="980405"/>
+          <a:off x="5171281" y="1975831"/>
+          <a:ext cx="1230312" cy="1467003"/>
         </a:xfrm>
         <a:prstGeom prst="roundRect">
           <a:avLst>
@@ -1683,8 +1704,8 @@
         </a:p>
       </dsp:txBody>
       <dsp:txXfrm>
-        <a:off x="5199996" y="2247845"/>
-        <a:ext cx="1172882" cy="922975"/>
+        <a:off x="5207316" y="2011866"/>
+        <a:ext cx="1158242" cy="1394933"/>
       </dsp:txXfrm>
     </dsp:sp>
     <dsp:sp modelId="{C720DE89-9EDD-4AE6-BD60-0ABFAC5C58BA}">
@@ -1764,8 +1785,8 @@
       </dsp:nvSpPr>
       <dsp:spPr>
         <a:xfrm>
-          <a:off x="6893718" y="2219130"/>
-          <a:ext cx="1230312" cy="980405"/>
+          <a:off x="6893718" y="1975831"/>
+          <a:ext cx="1230312" cy="1467003"/>
         </a:xfrm>
         <a:prstGeom prst="roundRect">
           <a:avLst>
@@ -1830,8 +1851,8 @@
         </a:p>
       </dsp:txBody>
       <dsp:txXfrm>
-        <a:off x="6922433" y="2247845"/>
-        <a:ext cx="1172882" cy="922975"/>
+        <a:off x="6929753" y="2011866"/>
+        <a:ext cx="1158242" cy="1394933"/>
       </dsp:txXfrm>
     </dsp:sp>
   </dsp:spTree>
@@ -3167,7 +3188,7 @@
           <a:p>
             <a:fld id="{5324BDD3-937A-4E63-80CC-0D9C067336B2}" type="datetimeFigureOut">
               <a:rPr lang="en-SG" smtClean="0"/>
-              <a:t>22/2/2023</a:t>
+              <a:t>1/3/2023</a:t>
             </a:fld>
             <a:endParaRPr lang="en-SG"/>
           </a:p>
@@ -3367,7 +3388,7 @@
           <a:p>
             <a:fld id="{5324BDD3-937A-4E63-80CC-0D9C067336B2}" type="datetimeFigureOut">
               <a:rPr lang="en-SG" smtClean="0"/>
-              <a:t>22/2/2023</a:t>
+              <a:t>1/3/2023</a:t>
             </a:fld>
             <a:endParaRPr lang="en-SG"/>
           </a:p>
@@ -3577,7 +3598,7 @@
           <a:p>
             <a:fld id="{5324BDD3-937A-4E63-80CC-0D9C067336B2}" type="datetimeFigureOut">
               <a:rPr lang="en-SG" smtClean="0"/>
-              <a:t>22/2/2023</a:t>
+              <a:t>1/3/2023</a:t>
             </a:fld>
             <a:endParaRPr lang="en-SG"/>
           </a:p>
@@ -3777,7 +3798,7 @@
           <a:p>
             <a:fld id="{5324BDD3-937A-4E63-80CC-0D9C067336B2}" type="datetimeFigureOut">
               <a:rPr lang="en-SG" smtClean="0"/>
-              <a:t>22/2/2023</a:t>
+              <a:t>1/3/2023</a:t>
             </a:fld>
             <a:endParaRPr lang="en-SG"/>
           </a:p>
@@ -4053,7 +4074,7 @@
           <a:p>
             <a:fld id="{5324BDD3-937A-4E63-80CC-0D9C067336B2}" type="datetimeFigureOut">
               <a:rPr lang="en-SG" smtClean="0"/>
-              <a:t>22/2/2023</a:t>
+              <a:t>1/3/2023</a:t>
             </a:fld>
             <a:endParaRPr lang="en-SG"/>
           </a:p>
@@ -4321,7 +4342,7 @@
           <a:p>
             <a:fld id="{5324BDD3-937A-4E63-80CC-0D9C067336B2}" type="datetimeFigureOut">
               <a:rPr lang="en-SG" smtClean="0"/>
-              <a:t>22/2/2023</a:t>
+              <a:t>1/3/2023</a:t>
             </a:fld>
             <a:endParaRPr lang="en-SG"/>
           </a:p>
@@ -4736,7 +4757,7 @@
           <a:p>
             <a:fld id="{5324BDD3-937A-4E63-80CC-0D9C067336B2}" type="datetimeFigureOut">
               <a:rPr lang="en-SG" smtClean="0"/>
-              <a:t>22/2/2023</a:t>
+              <a:t>1/3/2023</a:t>
             </a:fld>
             <a:endParaRPr lang="en-SG"/>
           </a:p>
@@ -4878,7 +4899,7 @@
           <a:p>
             <a:fld id="{5324BDD3-937A-4E63-80CC-0D9C067336B2}" type="datetimeFigureOut">
               <a:rPr lang="en-SG" smtClean="0"/>
-              <a:t>22/2/2023</a:t>
+              <a:t>1/3/2023</a:t>
             </a:fld>
             <a:endParaRPr lang="en-SG"/>
           </a:p>
@@ -4991,7 +5012,7 @@
           <a:p>
             <a:fld id="{5324BDD3-937A-4E63-80CC-0D9C067336B2}" type="datetimeFigureOut">
               <a:rPr lang="en-SG" smtClean="0"/>
-              <a:t>22/2/2023</a:t>
+              <a:t>1/3/2023</a:t>
             </a:fld>
             <a:endParaRPr lang="en-SG"/>
           </a:p>
@@ -5304,7 +5325,7 @@
           <a:p>
             <a:fld id="{5324BDD3-937A-4E63-80CC-0D9C067336B2}" type="datetimeFigureOut">
               <a:rPr lang="en-SG" smtClean="0"/>
-              <a:t>22/2/2023</a:t>
+              <a:t>1/3/2023</a:t>
             </a:fld>
             <a:endParaRPr lang="en-SG"/>
           </a:p>
@@ -5593,7 +5614,7 @@
           <a:p>
             <a:fld id="{5324BDD3-937A-4E63-80CC-0D9C067336B2}" type="datetimeFigureOut">
               <a:rPr lang="en-SG" smtClean="0"/>
-              <a:t>22/2/2023</a:t>
+              <a:t>1/3/2023</a:t>
             </a:fld>
             <a:endParaRPr lang="en-SG"/>
           </a:p>
@@ -5836,7 +5857,7 @@
           <a:p>
             <a:fld id="{5324BDD3-937A-4E63-80CC-0D9C067336B2}" type="datetimeFigureOut">
               <a:rPr lang="en-SG" smtClean="0"/>
-              <a:t>22/2/2023</a:t>
+              <a:t>1/3/2023</a:t>
             </a:fld>
             <a:endParaRPr lang="en-SG"/>
           </a:p>
@@ -6296,7 +6317,7 @@
           <p:nvPr>
             <p:extLst>
               <p:ext uri="{D42A27DB-BD31-4B8C-83A1-F6EECF244321}">
-                <p14:modId xmlns:p14="http://schemas.microsoft.com/office/powerpoint/2010/main" val="408363256"/>
+                <p14:modId xmlns:p14="http://schemas.microsoft.com/office/powerpoint/2010/main" val="372655099"/>
               </p:ext>
             </p:extLst>
           </p:nvPr>

</xml_diff>

<commit_message>
after meeting with jonathan
</commit_message>
<xml_diff>
--- a/Flow.pptx
+++ b/Flow.pptx
@@ -876,7 +876,7 @@
         <a:p>
           <a:r>
             <a:rPr lang="en-US" dirty="0"/>
-            <a:t>User uploads file</a:t>
+            <a:t>User uploads file (Postman)</a:t>
           </a:r>
           <a:endParaRPr lang="en-SG" dirty="0"/>
         </a:p>
@@ -913,7 +913,7 @@
         <a:p>
           <a:r>
             <a:rPr lang="en-US" dirty="0"/>
-            <a:t>Backend receives and saves CSV into queue</a:t>
+            <a:t>Backend receives, saves and add name &amp; row into queue</a:t>
           </a:r>
           <a:endParaRPr lang="en-SG" dirty="0"/>
         </a:p>
@@ -942,13 +942,16 @@
       </dgm:t>
     </dgm:pt>
     <dgm:pt modelId="{00903268-25BB-44FF-95C0-F74541971798}">
-      <dgm:prSet phldrT="[Text]" phldr="1"/>
+      <dgm:prSet phldrT="[Text]"/>
       <dgm:spPr/>
       <dgm:t>
         <a:bodyPr/>
         <a:lstStyle/>
         <a:p>
-          <a:endParaRPr lang="en-SG"/>
+          <a:r>
+            <a:rPr lang="en-SG" dirty="0"/>
+            <a:t>Display frontend </a:t>
+          </a:r>
         </a:p>
       </dgm:t>
     </dgm:pt>
@@ -982,10 +985,17 @@
         <a:lstStyle/>
         <a:p>
           <a:r>
-            <a:rPr lang="en-US"/>
-            <a:t>and processes</a:t>
+            <a:rPr lang="en-SG" dirty="0"/>
+            <a:t>Call VT </a:t>
           </a:r>
-          <a:endParaRPr lang="en-SG"/>
+          <a:r>
+            <a:rPr lang="en-SG" dirty="0" err="1"/>
+            <a:t>Api</a:t>
+          </a:r>
+          <a:r>
+            <a:rPr lang="en-SG" dirty="0"/>
+            <a:t> every XX hours for 500 rows</a:t>
+          </a:r>
         </a:p>
       </dgm:t>
     </dgm:pt>
@@ -1012,13 +1022,21 @@
       </dgm:t>
     </dgm:pt>
     <dgm:pt modelId="{C64192D6-5527-497B-96A6-636E260BC0AD}">
-      <dgm:prSet phldrT="[Text]" phldr="1"/>
+      <dgm:prSet phldrT="[Text]"/>
       <dgm:spPr/>
       <dgm:t>
         <a:bodyPr/>
         <a:lstStyle/>
         <a:p>
-          <a:endParaRPr lang="en-SG"/>
+          <a:r>
+            <a:rPr lang="en-SG" dirty="0"/>
+            <a:t>Add results to </a:t>
+          </a:r>
+          <a:r>
+            <a:rPr lang="en-SG" dirty="0" err="1"/>
+            <a:t>db</a:t>
+          </a:r>
+          <a:endParaRPr lang="en-SG" dirty="0"/>
         </a:p>
       </dgm:t>
     </dgm:pt>
@@ -1044,6 +1062,39 @@
         </a:p>
       </dgm:t>
     </dgm:pt>
+    <dgm:pt modelId="{3861B95F-7087-47BB-8629-18F0C177FB63}">
+      <dgm:prSet phldrT="[Text]"/>
+      <dgm:spPr/>
+      <dgm:t>
+        <a:bodyPr/>
+        <a:lstStyle/>
+        <a:p>
+          <a:endParaRPr lang="en-SG" dirty="0"/>
+        </a:p>
+      </dgm:t>
+    </dgm:pt>
+    <dgm:pt modelId="{12E619EB-5920-4B5C-AB97-2C4AC466C38D}" type="parTrans" cxnId="{9BEE3EA7-E9BE-4A8B-88EA-CCA45489ACB0}">
+      <dgm:prSet/>
+      <dgm:spPr/>
+      <dgm:t>
+        <a:bodyPr/>
+        <a:lstStyle/>
+        <a:p>
+          <a:endParaRPr lang="en-SG"/>
+        </a:p>
+      </dgm:t>
+    </dgm:pt>
+    <dgm:pt modelId="{0F51B172-6D49-4B3C-8ADB-96DA78D819A1}" type="sibTrans" cxnId="{9BEE3EA7-E9BE-4A8B-88EA-CCA45489ACB0}">
+      <dgm:prSet/>
+      <dgm:spPr/>
+      <dgm:t>
+        <a:bodyPr/>
+        <a:lstStyle/>
+        <a:p>
+          <a:endParaRPr lang="en-SG"/>
+        </a:p>
+      </dgm:t>
+    </dgm:pt>
     <dgm:pt modelId="{2425EC08-6A28-4A6C-A87E-F35F2526D52F}" type="pres">
       <dgm:prSet presAssocID="{6B30A3E1-DC90-4F50-A492-D93E54C8917B}" presName="Name0" presStyleCnt="0">
         <dgm:presLayoutVars>
@@ -1054,7 +1105,7 @@
       <dgm:spPr/>
     </dgm:pt>
     <dgm:pt modelId="{0803640D-40FD-4039-A83B-76C9832F9969}" type="pres">
-      <dgm:prSet presAssocID="{DDE00141-BF4A-4A0C-B3BD-733DE718FA4C}" presName="node" presStyleLbl="node1" presStyleIdx="0" presStyleCnt="5">
+      <dgm:prSet presAssocID="{DDE00141-BF4A-4A0C-B3BD-733DE718FA4C}" presName="node" presStyleLbl="node1" presStyleIdx="0" presStyleCnt="6">
         <dgm:presLayoutVars>
           <dgm:bulletEnabled val="1"/>
         </dgm:presLayoutVars>
@@ -1062,15 +1113,15 @@
       <dgm:spPr/>
     </dgm:pt>
     <dgm:pt modelId="{84572B7C-B943-4B73-8341-7B59ADC20F66}" type="pres">
-      <dgm:prSet presAssocID="{6AE8CF5D-21BB-4F19-ACCA-A2FDF89BAD9A}" presName="sibTrans" presStyleLbl="sibTrans2D1" presStyleIdx="0" presStyleCnt="4"/>
+      <dgm:prSet presAssocID="{6AE8CF5D-21BB-4F19-ACCA-A2FDF89BAD9A}" presName="sibTrans" presStyleLbl="sibTrans2D1" presStyleIdx="0" presStyleCnt="5"/>
       <dgm:spPr/>
     </dgm:pt>
     <dgm:pt modelId="{1A9C2101-F7EE-4A8F-8C64-3582C1A05EE2}" type="pres">
-      <dgm:prSet presAssocID="{6AE8CF5D-21BB-4F19-ACCA-A2FDF89BAD9A}" presName="connectorText" presStyleLbl="sibTrans2D1" presStyleIdx="0" presStyleCnt="4"/>
+      <dgm:prSet presAssocID="{6AE8CF5D-21BB-4F19-ACCA-A2FDF89BAD9A}" presName="connectorText" presStyleLbl="sibTrans2D1" presStyleIdx="0" presStyleCnt="5"/>
       <dgm:spPr/>
     </dgm:pt>
     <dgm:pt modelId="{52AE989D-D49D-439B-A237-0EF283D12B0A}" type="pres">
-      <dgm:prSet presAssocID="{9797697C-FB66-4D27-B519-829E06BC6EEF}" presName="node" presStyleLbl="node1" presStyleIdx="1" presStyleCnt="5" custLinFactNeighborX="4645" custLinFactNeighborY="0">
+      <dgm:prSet presAssocID="{9797697C-FB66-4D27-B519-829E06BC6EEF}" presName="node" presStyleLbl="node1" presStyleIdx="1" presStyleCnt="6" custLinFactNeighborX="4645" custLinFactNeighborY="0">
         <dgm:presLayoutVars>
           <dgm:bulletEnabled val="1"/>
         </dgm:presLayoutVars>
@@ -1078,15 +1129,15 @@
       <dgm:spPr/>
     </dgm:pt>
     <dgm:pt modelId="{81193323-1490-43C3-A250-B3FD4CF49F56}" type="pres">
-      <dgm:prSet presAssocID="{7A145398-A32F-41A0-9A31-0EFF634DD06F}" presName="sibTrans" presStyleLbl="sibTrans2D1" presStyleIdx="1" presStyleCnt="4"/>
+      <dgm:prSet presAssocID="{7A145398-A32F-41A0-9A31-0EFF634DD06F}" presName="sibTrans" presStyleLbl="sibTrans2D1" presStyleIdx="1" presStyleCnt="5"/>
       <dgm:spPr/>
     </dgm:pt>
     <dgm:pt modelId="{8F0E6D1F-BF48-4CEA-90F0-4DF27666F680}" type="pres">
-      <dgm:prSet presAssocID="{7A145398-A32F-41A0-9A31-0EFF634DD06F}" presName="connectorText" presStyleLbl="sibTrans2D1" presStyleIdx="1" presStyleCnt="4"/>
+      <dgm:prSet presAssocID="{7A145398-A32F-41A0-9A31-0EFF634DD06F}" presName="connectorText" presStyleLbl="sibTrans2D1" presStyleIdx="1" presStyleCnt="5"/>
       <dgm:spPr/>
     </dgm:pt>
     <dgm:pt modelId="{9E6150FE-12DC-40C0-980E-51C8CE24ABA0}" type="pres">
-      <dgm:prSet presAssocID="{7EEF927A-C588-4033-B096-82F60784A255}" presName="node" presStyleLbl="node1" presStyleIdx="2" presStyleCnt="5">
+      <dgm:prSet presAssocID="{7EEF927A-C588-4033-B096-82F60784A255}" presName="node" presStyleLbl="node1" presStyleIdx="2" presStyleCnt="6">
         <dgm:presLayoutVars>
           <dgm:bulletEnabled val="1"/>
         </dgm:presLayoutVars>
@@ -1094,15 +1145,15 @@
       <dgm:spPr/>
     </dgm:pt>
     <dgm:pt modelId="{877B6B1C-3AE2-4AAD-91B6-F7BB1F9CE3A8}" type="pres">
-      <dgm:prSet presAssocID="{1B9343B1-240E-4F90-B3AF-5D25BCFB8404}" presName="sibTrans" presStyleLbl="sibTrans2D1" presStyleIdx="2" presStyleCnt="4"/>
+      <dgm:prSet presAssocID="{1B9343B1-240E-4F90-B3AF-5D25BCFB8404}" presName="sibTrans" presStyleLbl="sibTrans2D1" presStyleIdx="2" presStyleCnt="5"/>
       <dgm:spPr/>
     </dgm:pt>
     <dgm:pt modelId="{0D5B13DC-F353-4600-A68A-F7B3B0B9E969}" type="pres">
-      <dgm:prSet presAssocID="{1B9343B1-240E-4F90-B3AF-5D25BCFB8404}" presName="connectorText" presStyleLbl="sibTrans2D1" presStyleIdx="2" presStyleCnt="4"/>
+      <dgm:prSet presAssocID="{1B9343B1-240E-4F90-B3AF-5D25BCFB8404}" presName="connectorText" presStyleLbl="sibTrans2D1" presStyleIdx="2" presStyleCnt="5"/>
       <dgm:spPr/>
     </dgm:pt>
     <dgm:pt modelId="{C5E1BD7D-0583-45E4-B6AA-259627DA942B}" type="pres">
-      <dgm:prSet presAssocID="{C64192D6-5527-497B-96A6-636E260BC0AD}" presName="node" presStyleLbl="node1" presStyleIdx="3" presStyleCnt="5">
+      <dgm:prSet presAssocID="{C64192D6-5527-497B-96A6-636E260BC0AD}" presName="node" presStyleLbl="node1" presStyleIdx="3" presStyleCnt="6">
         <dgm:presLayoutVars>
           <dgm:bulletEnabled val="1"/>
         </dgm:presLayoutVars>
@@ -1110,15 +1161,31 @@
       <dgm:spPr/>
     </dgm:pt>
     <dgm:pt modelId="{C720DE89-9EDD-4AE6-BD60-0ABFAC5C58BA}" type="pres">
-      <dgm:prSet presAssocID="{5B493D58-B3D8-47E0-BD44-E38FF8008603}" presName="sibTrans" presStyleLbl="sibTrans2D1" presStyleIdx="3" presStyleCnt="4"/>
+      <dgm:prSet presAssocID="{5B493D58-B3D8-47E0-BD44-E38FF8008603}" presName="sibTrans" presStyleLbl="sibTrans2D1" presStyleIdx="3" presStyleCnt="5"/>
       <dgm:spPr/>
     </dgm:pt>
     <dgm:pt modelId="{45174732-98B3-435F-ACC2-0BC7C2ABC7D7}" type="pres">
-      <dgm:prSet presAssocID="{5B493D58-B3D8-47E0-BD44-E38FF8008603}" presName="connectorText" presStyleLbl="sibTrans2D1" presStyleIdx="3" presStyleCnt="4"/>
+      <dgm:prSet presAssocID="{5B493D58-B3D8-47E0-BD44-E38FF8008603}" presName="connectorText" presStyleLbl="sibTrans2D1" presStyleIdx="3" presStyleCnt="5"/>
       <dgm:spPr/>
     </dgm:pt>
     <dgm:pt modelId="{81A4EEFF-A2E6-4FF0-BDC4-11BF6DD2E2A9}" type="pres">
-      <dgm:prSet presAssocID="{00903268-25BB-44FF-95C0-F74541971798}" presName="node" presStyleLbl="node1" presStyleIdx="4" presStyleCnt="5">
+      <dgm:prSet presAssocID="{00903268-25BB-44FF-95C0-F74541971798}" presName="node" presStyleLbl="node1" presStyleIdx="4" presStyleCnt="6">
+        <dgm:presLayoutVars>
+          <dgm:bulletEnabled val="1"/>
+        </dgm:presLayoutVars>
+      </dgm:prSet>
+      <dgm:spPr/>
+    </dgm:pt>
+    <dgm:pt modelId="{F4AED71B-C416-40EC-95C4-930C85D6106C}" type="pres">
+      <dgm:prSet presAssocID="{602BF387-4252-4A27-9612-E62C354A4A5B}" presName="sibTrans" presStyleLbl="sibTrans2D1" presStyleIdx="4" presStyleCnt="5"/>
+      <dgm:spPr/>
+    </dgm:pt>
+    <dgm:pt modelId="{A38FC7C9-411E-48E5-A8E4-E0E8C68EF69E}" type="pres">
+      <dgm:prSet presAssocID="{602BF387-4252-4A27-9612-E62C354A4A5B}" presName="connectorText" presStyleLbl="sibTrans2D1" presStyleIdx="4" presStyleCnt="5"/>
+      <dgm:spPr/>
+    </dgm:pt>
+    <dgm:pt modelId="{9ECE7C7F-86C6-4110-AD50-15FFC8118AF6}" type="pres">
+      <dgm:prSet presAssocID="{3861B95F-7087-47BB-8629-18F0C177FB63}" presName="node" presStyleLbl="node1" presStyleIdx="5" presStyleCnt="6">
         <dgm:presLayoutVars>
           <dgm:bulletEnabled val="1"/>
         </dgm:presLayoutVars>
@@ -1128,7 +1195,9 @@
   </dgm:ptLst>
   <dgm:cxnLst>
     <dgm:cxn modelId="{770B1300-8E7B-4795-B762-EC55BAE1E64D}" type="presOf" srcId="{DDE00141-BF4A-4A0C-B3BD-733DE718FA4C}" destId="{0803640D-40FD-4039-A83B-76C9832F9969}" srcOrd="0" destOrd="0" presId="urn:microsoft.com/office/officeart/2005/8/layout/process1"/>
+    <dgm:cxn modelId="{B200D408-F666-42CC-A068-5C0AC248D97E}" type="presOf" srcId="{602BF387-4252-4A27-9612-E62C354A4A5B}" destId="{A38FC7C9-411E-48E5-A8E4-E0E8C68EF69E}" srcOrd="1" destOrd="0" presId="urn:microsoft.com/office/officeart/2005/8/layout/process1"/>
     <dgm:cxn modelId="{4DD00E0E-0FB6-450B-B3B3-8967BBAC83FC}" type="presOf" srcId="{7A145398-A32F-41A0-9A31-0EFF634DD06F}" destId="{81193323-1490-43C3-A250-B3FD4CF49F56}" srcOrd="0" destOrd="0" presId="urn:microsoft.com/office/officeart/2005/8/layout/process1"/>
+    <dgm:cxn modelId="{4B8EC811-E3D1-4CB0-BA50-9A4FF33476E2}" type="presOf" srcId="{602BF387-4252-4A27-9612-E62C354A4A5B}" destId="{F4AED71B-C416-40EC-95C4-930C85D6106C}" srcOrd="0" destOrd="0" presId="urn:microsoft.com/office/officeart/2005/8/layout/process1"/>
     <dgm:cxn modelId="{6BE4C812-6323-4EF6-B55D-0A06D2468A02}" srcId="{6B30A3E1-DC90-4F50-A492-D93E54C8917B}" destId="{DDE00141-BF4A-4A0C-B3BD-733DE718FA4C}" srcOrd="0" destOrd="0" parTransId="{40167B10-D4C9-4E9A-90BE-2F222568C631}" sibTransId="{6AE8CF5D-21BB-4F19-ACCA-A2FDF89BAD9A}"/>
     <dgm:cxn modelId="{16632226-51A7-48DF-8838-65EDF21F496E}" type="presOf" srcId="{C64192D6-5527-497B-96A6-636E260BC0AD}" destId="{C5E1BD7D-0583-45E4-B6AA-259627DA942B}" srcOrd="0" destOrd="0" presId="urn:microsoft.com/office/officeart/2005/8/layout/process1"/>
     <dgm:cxn modelId="{8A844A5B-3C9D-4245-B9CE-80C2FDA3F2FA}" type="presOf" srcId="{1B9343B1-240E-4F90-B3AF-5D25BCFB8404}" destId="{877B6B1C-3AE2-4AAD-91B6-F7BB1F9CE3A8}" srcOrd="0" destOrd="0" presId="urn:microsoft.com/office/officeart/2005/8/layout/process1"/>
@@ -1140,12 +1209,14 @@
     <dgm:cxn modelId="{8EFE3A90-6CF2-4298-A913-21044FB8E9C5}" type="presOf" srcId="{7A145398-A32F-41A0-9A31-0EFF634DD06F}" destId="{8F0E6D1F-BF48-4CEA-90F0-4DF27666F680}" srcOrd="1" destOrd="0" presId="urn:microsoft.com/office/officeart/2005/8/layout/process1"/>
     <dgm:cxn modelId="{14E70893-F62A-40ED-991C-D0946CA2BEE5}" type="presOf" srcId="{6B30A3E1-DC90-4F50-A492-D93E54C8917B}" destId="{2425EC08-6A28-4A6C-A87E-F35F2526D52F}" srcOrd="0" destOrd="0" presId="urn:microsoft.com/office/officeart/2005/8/layout/process1"/>
     <dgm:cxn modelId="{58E90DA3-B085-4F11-98CE-621E58A1FD3D}" type="presOf" srcId="{00903268-25BB-44FF-95C0-F74541971798}" destId="{81A4EEFF-A2E6-4FF0-BDC4-11BF6DD2E2A9}" srcOrd="0" destOrd="0" presId="urn:microsoft.com/office/officeart/2005/8/layout/process1"/>
+    <dgm:cxn modelId="{9BEE3EA7-E9BE-4A8B-88EA-CCA45489ACB0}" srcId="{6B30A3E1-DC90-4F50-A492-D93E54C8917B}" destId="{3861B95F-7087-47BB-8629-18F0C177FB63}" srcOrd="5" destOrd="0" parTransId="{12E619EB-5920-4B5C-AB97-2C4AC466C38D}" sibTransId="{0F51B172-6D49-4B3C-8ADB-96DA78D819A1}"/>
     <dgm:cxn modelId="{650E1ECA-D6DA-44A5-AB3D-8C7EC29D7867}" type="presOf" srcId="{5B493D58-B3D8-47E0-BD44-E38FF8008603}" destId="{C720DE89-9EDD-4AE6-BD60-0ABFAC5C58BA}" srcOrd="0" destOrd="0" presId="urn:microsoft.com/office/officeart/2005/8/layout/process1"/>
     <dgm:cxn modelId="{C57111DA-42BF-410B-903E-8FE131077A3E}" type="presOf" srcId="{7EEF927A-C588-4033-B096-82F60784A255}" destId="{9E6150FE-12DC-40C0-980E-51C8CE24ABA0}" srcOrd="0" destOrd="0" presId="urn:microsoft.com/office/officeart/2005/8/layout/process1"/>
     <dgm:cxn modelId="{475478E0-70FA-4F96-B10B-37EF989112D7}" srcId="{6B30A3E1-DC90-4F50-A492-D93E54C8917B}" destId="{7EEF927A-C588-4033-B096-82F60784A255}" srcOrd="2" destOrd="0" parTransId="{5F079868-8931-4D95-A2DC-56C4057490E3}" sibTransId="{1B9343B1-240E-4F90-B3AF-5D25BCFB8404}"/>
     <dgm:cxn modelId="{544616F5-F746-42E7-A4AC-669C4A7829EA}" type="presOf" srcId="{6AE8CF5D-21BB-4F19-ACCA-A2FDF89BAD9A}" destId="{84572B7C-B943-4B73-8341-7B59ADC20F66}" srcOrd="0" destOrd="0" presId="urn:microsoft.com/office/officeart/2005/8/layout/process1"/>
     <dgm:cxn modelId="{346920FB-7E7F-475A-B30F-5CF16A9A49BB}" type="presOf" srcId="{1B9343B1-240E-4F90-B3AF-5D25BCFB8404}" destId="{0D5B13DC-F353-4600-A68A-F7B3B0B9E969}" srcOrd="1" destOrd="0" presId="urn:microsoft.com/office/officeart/2005/8/layout/process1"/>
     <dgm:cxn modelId="{321D22FC-B20E-4872-9059-AC73F080271C}" srcId="{6B30A3E1-DC90-4F50-A492-D93E54C8917B}" destId="{C64192D6-5527-497B-96A6-636E260BC0AD}" srcOrd="3" destOrd="0" parTransId="{DB157E61-5ADC-4CD3-AA93-695F5CB7CA1C}" sibTransId="{5B493D58-B3D8-47E0-BD44-E38FF8008603}"/>
+    <dgm:cxn modelId="{5BC62CFC-0241-4DFD-A446-AE96E16B2C82}" type="presOf" srcId="{3861B95F-7087-47BB-8629-18F0C177FB63}" destId="{9ECE7C7F-86C6-4110-AD50-15FFC8118AF6}" srcOrd="0" destOrd="0" presId="urn:microsoft.com/office/officeart/2005/8/layout/process1"/>
     <dgm:cxn modelId="{760BE190-E678-4448-A60A-6FAA6DE9BE56}" type="presParOf" srcId="{2425EC08-6A28-4A6C-A87E-F35F2526D52F}" destId="{0803640D-40FD-4039-A83B-76C9832F9969}" srcOrd="0" destOrd="0" presId="urn:microsoft.com/office/officeart/2005/8/layout/process1"/>
     <dgm:cxn modelId="{E94151FF-C25A-4691-84A7-688AE31A68FC}" type="presParOf" srcId="{2425EC08-6A28-4A6C-A87E-F35F2526D52F}" destId="{84572B7C-B943-4B73-8341-7B59ADC20F66}" srcOrd="1" destOrd="0" presId="urn:microsoft.com/office/officeart/2005/8/layout/process1"/>
     <dgm:cxn modelId="{F9C714FC-9E91-4066-9F14-F95DA5DFE064}" type="presParOf" srcId="{84572B7C-B943-4B73-8341-7B59ADC20F66}" destId="{1A9C2101-F7EE-4A8F-8C64-3582C1A05EE2}" srcOrd="0" destOrd="0" presId="urn:microsoft.com/office/officeart/2005/8/layout/process1"/>
@@ -1159,6 +1230,9 @@
     <dgm:cxn modelId="{6054E073-5609-4E9C-B819-4A2045313F0F}" type="presParOf" srcId="{2425EC08-6A28-4A6C-A87E-F35F2526D52F}" destId="{C720DE89-9EDD-4AE6-BD60-0ABFAC5C58BA}" srcOrd="7" destOrd="0" presId="urn:microsoft.com/office/officeart/2005/8/layout/process1"/>
     <dgm:cxn modelId="{9D088C07-1851-45EC-A103-7E8AA4AB1647}" type="presParOf" srcId="{C720DE89-9EDD-4AE6-BD60-0ABFAC5C58BA}" destId="{45174732-98B3-435F-ACC2-0BC7C2ABC7D7}" srcOrd="0" destOrd="0" presId="urn:microsoft.com/office/officeart/2005/8/layout/process1"/>
     <dgm:cxn modelId="{0FE6CA0A-BE7D-4BF9-9A74-1A506ED5E655}" type="presParOf" srcId="{2425EC08-6A28-4A6C-A87E-F35F2526D52F}" destId="{81A4EEFF-A2E6-4FF0-BDC4-11BF6DD2E2A9}" srcOrd="8" destOrd="0" presId="urn:microsoft.com/office/officeart/2005/8/layout/process1"/>
+    <dgm:cxn modelId="{A1B8DF90-B8E7-413C-9BB5-2032359424AC}" type="presParOf" srcId="{2425EC08-6A28-4A6C-A87E-F35F2526D52F}" destId="{F4AED71B-C416-40EC-95C4-930C85D6106C}" srcOrd="9" destOrd="0" presId="urn:microsoft.com/office/officeart/2005/8/layout/process1"/>
+    <dgm:cxn modelId="{AF9A5A78-A009-44CC-BDBC-6165E4B8CA70}" type="presParOf" srcId="{F4AED71B-C416-40EC-95C4-930C85D6106C}" destId="{A38FC7C9-411E-48E5-A8E4-E0E8C68EF69E}" srcOrd="0" destOrd="0" presId="urn:microsoft.com/office/officeart/2005/8/layout/process1"/>
+    <dgm:cxn modelId="{9FFEBC57-C92E-45F4-871D-290E101138E3}" type="presParOf" srcId="{2425EC08-6A28-4A6C-A87E-F35F2526D52F}" destId="{9ECE7C7F-86C6-4110-AD50-15FFC8118AF6}" srcOrd="10" destOrd="0" presId="urn:microsoft.com/office/officeart/2005/8/layout/process1"/>
   </dgm:cxnLst>
   <dgm:bg/>
   <dgm:whole/>
@@ -1185,8 +1259,8 @@
       </dsp:nvSpPr>
       <dsp:spPr>
         <a:xfrm>
-          <a:off x="3968" y="1975831"/>
-          <a:ext cx="1230312" cy="1467003"/>
+          <a:off x="0" y="2407252"/>
+          <a:ext cx="1435553" cy="1749580"/>
         </a:xfrm>
         <a:prstGeom prst="roundRect">
           <a:avLst>
@@ -1249,14 +1323,14 @@
           </a:pPr>
           <a:r>
             <a:rPr lang="en-US" sz="1800" kern="1200" dirty="0"/>
-            <a:t>User uploads file</a:t>
+            <a:t>User uploads file (Postman)</a:t>
           </a:r>
           <a:endParaRPr lang="en-SG" sz="1800" kern="1200" dirty="0"/>
         </a:p>
       </dsp:txBody>
       <dsp:txXfrm>
-        <a:off x="40003" y="2011866"/>
-        <a:ext cx="1158242" cy="1394933"/>
+        <a:off x="42046" y="2449298"/>
+        <a:ext cx="1351461" cy="1665488"/>
       </dsp:txXfrm>
     </dsp:sp>
     <dsp:sp modelId="{84572B7C-B943-4B73-8341-7B59ADC20F66}">
@@ -1266,8 +1340,8 @@
       </dsp:nvSpPr>
       <dsp:spPr>
         <a:xfrm>
-          <a:off x="1363027" y="2556774"/>
-          <a:ext cx="272941" cy="305117"/>
+          <a:off x="1585777" y="3104034"/>
+          <a:ext cx="318473" cy="356017"/>
         </a:xfrm>
         <a:prstGeom prst="rightArrow">
           <a:avLst>
@@ -1309,7 +1383,7 @@
         </a:bodyPr>
         <a:lstStyle/>
         <a:p>
-          <a:pPr marL="0" lvl="0" indent="0" algn="ctr" defTabSz="577850">
+          <a:pPr marL="0" lvl="0" indent="0" algn="ctr" defTabSz="622300">
             <a:lnSpc>
               <a:spcPct val="90000"/>
             </a:lnSpc>
@@ -1321,12 +1395,12 @@
             </a:spcAft>
             <a:buNone/>
           </a:pPr>
-          <a:endParaRPr lang="en-SG" sz="1300" kern="1200"/>
+          <a:endParaRPr lang="en-SG" sz="1400" kern="1200"/>
         </a:p>
       </dsp:txBody>
       <dsp:txXfrm>
-        <a:off x="1363027" y="2617797"/>
-        <a:ext cx="191059" cy="183071"/>
+        <a:off x="1585777" y="3175237"/>
+        <a:ext cx="222931" cy="213611"/>
       </dsp:txXfrm>
     </dsp:sp>
     <dsp:sp modelId="{52AE989D-D49D-439B-A237-0EF283D12B0A}">
@@ -1336,8 +1410,8 @@
       </dsp:nvSpPr>
       <dsp:spPr>
         <a:xfrm>
-          <a:off x="1749265" y="1975831"/>
-          <a:ext cx="1230312" cy="1467003"/>
+          <a:off x="2036447" y="2407252"/>
+          <a:ext cx="1435553" cy="1749580"/>
         </a:xfrm>
         <a:prstGeom prst="roundRect">
           <a:avLst>
@@ -1400,14 +1474,14 @@
           </a:pPr>
           <a:r>
             <a:rPr lang="en-US" sz="1800" kern="1200" dirty="0"/>
-            <a:t>Backend receives and saves CSV into queue</a:t>
+            <a:t>Backend receives, saves and add name &amp; row into queue</a:t>
           </a:r>
           <a:endParaRPr lang="en-SG" sz="1800" kern="1200" dirty="0"/>
         </a:p>
       </dsp:txBody>
       <dsp:txXfrm>
-        <a:off x="1785300" y="2011866"/>
-        <a:ext cx="1158242" cy="1394933"/>
+        <a:off x="2078493" y="2449298"/>
+        <a:ext cx="1351461" cy="1665488"/>
       </dsp:txXfrm>
     </dsp:sp>
     <dsp:sp modelId="{81193323-1490-43C3-A250-B3FD4CF49F56}">
@@ -1417,8 +1491,8 @@
       </dsp:nvSpPr>
       <dsp:spPr>
         <a:xfrm>
-          <a:off x="3096894" y="2556774"/>
-          <a:ext cx="248710" cy="305117"/>
+          <a:off x="3608888" y="3104034"/>
+          <a:ext cx="290200" cy="356017"/>
         </a:xfrm>
         <a:prstGeom prst="rightArrow">
           <a:avLst>
@@ -1460,7 +1534,7 @@
         </a:bodyPr>
         <a:lstStyle/>
         <a:p>
-          <a:pPr marL="0" lvl="0" indent="0" algn="ctr" defTabSz="577850">
+          <a:pPr marL="0" lvl="0" indent="0" algn="ctr" defTabSz="622300">
             <a:lnSpc>
               <a:spcPct val="90000"/>
             </a:lnSpc>
@@ -1472,12 +1546,12 @@
             </a:spcAft>
             <a:buNone/>
           </a:pPr>
-          <a:endParaRPr lang="en-SG" sz="1300" kern="1200"/>
+          <a:endParaRPr lang="en-SG" sz="1400" kern="1200"/>
         </a:p>
       </dsp:txBody>
       <dsp:txXfrm>
-        <a:off x="3096894" y="2617797"/>
-        <a:ext cx="174097" cy="183071"/>
+        <a:off x="3608888" y="3175237"/>
+        <a:ext cx="203140" cy="213611"/>
       </dsp:txXfrm>
     </dsp:sp>
     <dsp:sp modelId="{9E6150FE-12DC-40C0-980E-51C8CE24ABA0}">
@@ -1487,8 +1561,8 @@
       </dsp:nvSpPr>
       <dsp:spPr>
         <a:xfrm>
-          <a:off x="3448843" y="1975831"/>
-          <a:ext cx="1230312" cy="1467003"/>
+          <a:off x="4019550" y="2407252"/>
+          <a:ext cx="1435553" cy="1749580"/>
         </a:xfrm>
         <a:prstGeom prst="roundRect">
           <a:avLst>
@@ -1550,15 +1624,22 @@
             <a:buNone/>
           </a:pPr>
           <a:r>
-            <a:rPr lang="en-US" sz="1800" kern="1200"/>
-            <a:t>and processes</a:t>
+            <a:rPr lang="en-SG" sz="1800" kern="1200" dirty="0"/>
+            <a:t>Call VT </a:t>
           </a:r>
-          <a:endParaRPr lang="en-SG" sz="1800" kern="1200"/>
+          <a:r>
+            <a:rPr lang="en-SG" sz="1800" kern="1200" dirty="0" err="1"/>
+            <a:t>Api</a:t>
+          </a:r>
+          <a:r>
+            <a:rPr lang="en-SG" sz="1800" kern="1200" dirty="0"/>
+            <a:t> every XX hours for 500 rows</a:t>
+          </a:r>
         </a:p>
       </dsp:txBody>
       <dsp:txXfrm>
-        <a:off x="3484878" y="2011866"/>
-        <a:ext cx="1158242" cy="1394933"/>
+        <a:off x="4061596" y="2449298"/>
+        <a:ext cx="1351461" cy="1665488"/>
       </dsp:txXfrm>
     </dsp:sp>
     <dsp:sp modelId="{877B6B1C-3AE2-4AAD-91B6-F7BB1F9CE3A8}">
@@ -1568,8 +1649,8 @@
       </dsp:nvSpPr>
       <dsp:spPr>
         <a:xfrm>
-          <a:off x="4802187" y="2556774"/>
-          <a:ext cx="260826" cy="305117"/>
+          <a:off x="5598659" y="3104034"/>
+          <a:ext cx="304337" cy="356017"/>
         </a:xfrm>
         <a:prstGeom prst="rightArrow">
           <a:avLst>
@@ -1611,7 +1692,7 @@
         </a:bodyPr>
         <a:lstStyle/>
         <a:p>
-          <a:pPr marL="0" lvl="0" indent="0" algn="ctr" defTabSz="577850">
+          <a:pPr marL="0" lvl="0" indent="0" algn="ctr" defTabSz="622300">
             <a:lnSpc>
               <a:spcPct val="90000"/>
             </a:lnSpc>
@@ -1623,12 +1704,12 @@
             </a:spcAft>
             <a:buNone/>
           </a:pPr>
-          <a:endParaRPr lang="en-SG" sz="1300" kern="1200"/>
+          <a:endParaRPr lang="en-SG" sz="1400" kern="1200"/>
         </a:p>
       </dsp:txBody>
       <dsp:txXfrm>
-        <a:off x="4802187" y="2617797"/>
-        <a:ext cx="182578" cy="183071"/>
+        <a:off x="5598659" y="3175237"/>
+        <a:ext cx="213036" cy="213611"/>
       </dsp:txXfrm>
     </dsp:sp>
     <dsp:sp modelId="{C5E1BD7D-0583-45E4-B6AA-259627DA942B}">
@@ -1638,8 +1719,8 @@
       </dsp:nvSpPr>
       <dsp:spPr>
         <a:xfrm>
-          <a:off x="5171281" y="1975831"/>
-          <a:ext cx="1230312" cy="1467003"/>
+          <a:off x="6029325" y="2407252"/>
+          <a:ext cx="1435553" cy="1749580"/>
         </a:xfrm>
         <a:prstGeom prst="roundRect">
           <a:avLst>
@@ -1700,12 +1781,20 @@
             </a:spcAft>
             <a:buNone/>
           </a:pPr>
-          <a:endParaRPr lang="en-SG" sz="1800" kern="1200"/>
+          <a:r>
+            <a:rPr lang="en-SG" sz="1800" kern="1200" dirty="0"/>
+            <a:t>Add results to </a:t>
+          </a:r>
+          <a:r>
+            <a:rPr lang="en-SG" sz="1800" kern="1200" dirty="0" err="1"/>
+            <a:t>db</a:t>
+          </a:r>
+          <a:endParaRPr lang="en-SG" sz="1800" kern="1200" dirty="0"/>
         </a:p>
       </dsp:txBody>
       <dsp:txXfrm>
-        <a:off x="5207316" y="2011866"/>
-        <a:ext cx="1158242" cy="1394933"/>
+        <a:off x="6071371" y="2449298"/>
+        <a:ext cx="1351461" cy="1665488"/>
       </dsp:txXfrm>
     </dsp:sp>
     <dsp:sp modelId="{C720DE89-9EDD-4AE6-BD60-0ABFAC5C58BA}">
@@ -1715,8 +1804,8 @@
       </dsp:nvSpPr>
       <dsp:spPr>
         <a:xfrm>
-          <a:off x="6524624" y="2556774"/>
-          <a:ext cx="260826" cy="305117"/>
+          <a:off x="7608434" y="3104034"/>
+          <a:ext cx="304337" cy="356017"/>
         </a:xfrm>
         <a:prstGeom prst="rightArrow">
           <a:avLst>
@@ -1758,7 +1847,7 @@
         </a:bodyPr>
         <a:lstStyle/>
         <a:p>
-          <a:pPr marL="0" lvl="0" indent="0" algn="ctr" defTabSz="577850">
+          <a:pPr marL="0" lvl="0" indent="0" algn="ctr" defTabSz="622300">
             <a:lnSpc>
               <a:spcPct val="90000"/>
             </a:lnSpc>
@@ -1770,12 +1859,12 @@
             </a:spcAft>
             <a:buNone/>
           </a:pPr>
-          <a:endParaRPr lang="en-SG" sz="1300" kern="1200"/>
+          <a:endParaRPr lang="en-SG" sz="1400" kern="1200"/>
         </a:p>
       </dsp:txBody>
       <dsp:txXfrm>
-        <a:off x="6524624" y="2617797"/>
-        <a:ext cx="182578" cy="183071"/>
+        <a:off x="7608434" y="3175237"/>
+        <a:ext cx="213036" cy="213611"/>
       </dsp:txXfrm>
     </dsp:sp>
     <dsp:sp modelId="{81A4EEFF-A2E6-4FF0-BDC4-11BF6DD2E2A9}">
@@ -1785,8 +1874,8 @@
       </dsp:nvSpPr>
       <dsp:spPr>
         <a:xfrm>
-          <a:off x="6893718" y="1975831"/>
-          <a:ext cx="1230312" cy="1467003"/>
+          <a:off x="8039100" y="2407252"/>
+          <a:ext cx="1435553" cy="1749580"/>
         </a:xfrm>
         <a:prstGeom prst="roundRect">
           <a:avLst>
@@ -1847,12 +1936,162 @@
             </a:spcAft>
             <a:buNone/>
           </a:pPr>
-          <a:endParaRPr lang="en-SG" sz="1800" kern="1200"/>
+          <a:r>
+            <a:rPr lang="en-SG" sz="1800" kern="1200" dirty="0"/>
+            <a:t>Display frontend </a:t>
+          </a:r>
         </a:p>
       </dsp:txBody>
       <dsp:txXfrm>
-        <a:off x="6929753" y="2011866"/>
-        <a:ext cx="1158242" cy="1394933"/>
+        <a:off x="8081146" y="2449298"/>
+        <a:ext cx="1351461" cy="1665488"/>
+      </dsp:txXfrm>
+    </dsp:sp>
+    <dsp:sp modelId="{F4AED71B-C416-40EC-95C4-930C85D6106C}">
+      <dsp:nvSpPr>
+        <dsp:cNvPr id="0" name=""/>
+        <dsp:cNvSpPr/>
+      </dsp:nvSpPr>
+      <dsp:spPr>
+        <a:xfrm>
+          <a:off x="9618209" y="3104034"/>
+          <a:ext cx="304337" cy="356017"/>
+        </a:xfrm>
+        <a:prstGeom prst="rightArrow">
+          <a:avLst>
+            <a:gd name="adj1" fmla="val 60000"/>
+            <a:gd name="adj2" fmla="val 50000"/>
+          </a:avLst>
+        </a:prstGeom>
+        <a:solidFill>
+          <a:schemeClr val="accent1">
+            <a:tint val="60000"/>
+            <a:hueOff val="0"/>
+            <a:satOff val="0"/>
+            <a:lumOff val="0"/>
+            <a:alphaOff val="0"/>
+          </a:schemeClr>
+        </a:solidFill>
+        <a:ln>
+          <a:noFill/>
+        </a:ln>
+        <a:effectLst/>
+      </dsp:spPr>
+      <dsp:style>
+        <a:lnRef idx="0">
+          <a:scrgbClr r="0" g="0" b="0"/>
+        </a:lnRef>
+        <a:fillRef idx="1">
+          <a:scrgbClr r="0" g="0" b="0"/>
+        </a:fillRef>
+        <a:effectRef idx="0">
+          <a:scrgbClr r="0" g="0" b="0"/>
+        </a:effectRef>
+        <a:fontRef idx="minor">
+          <a:schemeClr val="lt1"/>
+        </a:fontRef>
+      </dsp:style>
+      <dsp:txBody>
+        <a:bodyPr spcFirstLastPara="0" vert="horz" wrap="square" lIns="0" tIns="0" rIns="0" bIns="0" numCol="1" spcCol="1270" anchor="ctr" anchorCtr="0">
+          <a:noAutofit/>
+        </a:bodyPr>
+        <a:lstStyle/>
+        <a:p>
+          <a:pPr marL="0" lvl="0" indent="0" algn="ctr" defTabSz="622300">
+            <a:lnSpc>
+              <a:spcPct val="90000"/>
+            </a:lnSpc>
+            <a:spcBef>
+              <a:spcPct val="0"/>
+            </a:spcBef>
+            <a:spcAft>
+              <a:spcPct val="35000"/>
+            </a:spcAft>
+            <a:buNone/>
+          </a:pPr>
+          <a:endParaRPr lang="en-SG" sz="1400" kern="1200"/>
+        </a:p>
+      </dsp:txBody>
+      <dsp:txXfrm>
+        <a:off x="9618209" y="3175237"/>
+        <a:ext cx="213036" cy="213611"/>
+      </dsp:txXfrm>
+    </dsp:sp>
+    <dsp:sp modelId="{9ECE7C7F-86C6-4110-AD50-15FFC8118AF6}">
+      <dsp:nvSpPr>
+        <dsp:cNvPr id="0" name=""/>
+        <dsp:cNvSpPr/>
+      </dsp:nvSpPr>
+      <dsp:spPr>
+        <a:xfrm>
+          <a:off x="10048875" y="2407252"/>
+          <a:ext cx="1435553" cy="1749580"/>
+        </a:xfrm>
+        <a:prstGeom prst="roundRect">
+          <a:avLst>
+            <a:gd name="adj" fmla="val 10000"/>
+          </a:avLst>
+        </a:prstGeom>
+        <a:solidFill>
+          <a:schemeClr val="accent1">
+            <a:hueOff val="0"/>
+            <a:satOff val="0"/>
+            <a:lumOff val="0"/>
+            <a:alphaOff val="0"/>
+          </a:schemeClr>
+        </a:solidFill>
+        <a:ln w="12700" cap="flat" cmpd="sng" algn="ctr">
+          <a:solidFill>
+            <a:schemeClr val="lt1">
+              <a:hueOff val="0"/>
+              <a:satOff val="0"/>
+              <a:lumOff val="0"/>
+              <a:alphaOff val="0"/>
+            </a:schemeClr>
+          </a:solidFill>
+          <a:prstDash val="solid"/>
+          <a:miter lim="800000"/>
+        </a:ln>
+        <a:effectLst/>
+      </dsp:spPr>
+      <dsp:style>
+        <a:lnRef idx="2">
+          <a:scrgbClr r="0" g="0" b="0"/>
+        </a:lnRef>
+        <a:fillRef idx="1">
+          <a:scrgbClr r="0" g="0" b="0"/>
+        </a:fillRef>
+        <a:effectRef idx="0">
+          <a:scrgbClr r="0" g="0" b="0"/>
+        </a:effectRef>
+        <a:fontRef idx="minor">
+          <a:schemeClr val="lt1"/>
+        </a:fontRef>
+      </dsp:style>
+      <dsp:txBody>
+        <a:bodyPr spcFirstLastPara="0" vert="horz" wrap="square" lIns="68580" tIns="68580" rIns="68580" bIns="68580" numCol="1" spcCol="1270" anchor="ctr" anchorCtr="0">
+          <a:noAutofit/>
+        </a:bodyPr>
+        <a:lstStyle/>
+        <a:p>
+          <a:pPr marL="0" lvl="0" indent="0" algn="ctr" defTabSz="800100">
+            <a:lnSpc>
+              <a:spcPct val="90000"/>
+            </a:lnSpc>
+            <a:spcBef>
+              <a:spcPct val="0"/>
+            </a:spcBef>
+            <a:spcAft>
+              <a:spcPct val="35000"/>
+            </a:spcAft>
+            <a:buNone/>
+          </a:pPr>
+          <a:endParaRPr lang="en-SG" sz="1800" kern="1200" dirty="0"/>
+        </a:p>
+      </dsp:txBody>
+      <dsp:txXfrm>
+        <a:off x="10090921" y="2449298"/>
+        <a:ext cx="1351461" cy="1665488"/>
       </dsp:txXfrm>
     </dsp:sp>
   </dsp:spTree>
@@ -3188,7 +3427,7 @@
           <a:p>
             <a:fld id="{5324BDD3-937A-4E63-80CC-0D9C067336B2}" type="datetimeFigureOut">
               <a:rPr lang="en-SG" smtClean="0"/>
-              <a:t>1/3/2023</a:t>
+              <a:t>2/3/2023</a:t>
             </a:fld>
             <a:endParaRPr lang="en-SG"/>
           </a:p>
@@ -3388,7 +3627,7 @@
           <a:p>
             <a:fld id="{5324BDD3-937A-4E63-80CC-0D9C067336B2}" type="datetimeFigureOut">
               <a:rPr lang="en-SG" smtClean="0"/>
-              <a:t>1/3/2023</a:t>
+              <a:t>2/3/2023</a:t>
             </a:fld>
             <a:endParaRPr lang="en-SG"/>
           </a:p>
@@ -3598,7 +3837,7 @@
           <a:p>
             <a:fld id="{5324BDD3-937A-4E63-80CC-0D9C067336B2}" type="datetimeFigureOut">
               <a:rPr lang="en-SG" smtClean="0"/>
-              <a:t>1/3/2023</a:t>
+              <a:t>2/3/2023</a:t>
             </a:fld>
             <a:endParaRPr lang="en-SG"/>
           </a:p>
@@ -3798,7 +4037,7 @@
           <a:p>
             <a:fld id="{5324BDD3-937A-4E63-80CC-0D9C067336B2}" type="datetimeFigureOut">
               <a:rPr lang="en-SG" smtClean="0"/>
-              <a:t>1/3/2023</a:t>
+              <a:t>2/3/2023</a:t>
             </a:fld>
             <a:endParaRPr lang="en-SG"/>
           </a:p>
@@ -4074,7 +4313,7 @@
           <a:p>
             <a:fld id="{5324BDD3-937A-4E63-80CC-0D9C067336B2}" type="datetimeFigureOut">
               <a:rPr lang="en-SG" smtClean="0"/>
-              <a:t>1/3/2023</a:t>
+              <a:t>2/3/2023</a:t>
             </a:fld>
             <a:endParaRPr lang="en-SG"/>
           </a:p>
@@ -4342,7 +4581,7 @@
           <a:p>
             <a:fld id="{5324BDD3-937A-4E63-80CC-0D9C067336B2}" type="datetimeFigureOut">
               <a:rPr lang="en-SG" smtClean="0"/>
-              <a:t>1/3/2023</a:t>
+              <a:t>2/3/2023</a:t>
             </a:fld>
             <a:endParaRPr lang="en-SG"/>
           </a:p>
@@ -4757,7 +4996,7 @@
           <a:p>
             <a:fld id="{5324BDD3-937A-4E63-80CC-0D9C067336B2}" type="datetimeFigureOut">
               <a:rPr lang="en-SG" smtClean="0"/>
-              <a:t>1/3/2023</a:t>
+              <a:t>2/3/2023</a:t>
             </a:fld>
             <a:endParaRPr lang="en-SG"/>
           </a:p>
@@ -4899,7 +5138,7 @@
           <a:p>
             <a:fld id="{5324BDD3-937A-4E63-80CC-0D9C067336B2}" type="datetimeFigureOut">
               <a:rPr lang="en-SG" smtClean="0"/>
-              <a:t>1/3/2023</a:t>
+              <a:t>2/3/2023</a:t>
             </a:fld>
             <a:endParaRPr lang="en-SG"/>
           </a:p>
@@ -5012,7 +5251,7 @@
           <a:p>
             <a:fld id="{5324BDD3-937A-4E63-80CC-0D9C067336B2}" type="datetimeFigureOut">
               <a:rPr lang="en-SG" smtClean="0"/>
-              <a:t>1/3/2023</a:t>
+              <a:t>2/3/2023</a:t>
             </a:fld>
             <a:endParaRPr lang="en-SG"/>
           </a:p>
@@ -5325,7 +5564,7 @@
           <a:p>
             <a:fld id="{5324BDD3-937A-4E63-80CC-0D9C067336B2}" type="datetimeFigureOut">
               <a:rPr lang="en-SG" smtClean="0"/>
-              <a:t>1/3/2023</a:t>
+              <a:t>2/3/2023</a:t>
             </a:fld>
             <a:endParaRPr lang="en-SG"/>
           </a:p>
@@ -5614,7 +5853,7 @@
           <a:p>
             <a:fld id="{5324BDD3-937A-4E63-80CC-0D9C067336B2}" type="datetimeFigureOut">
               <a:rPr lang="en-SG" smtClean="0"/>
-              <a:t>1/3/2023</a:t>
+              <a:t>2/3/2023</a:t>
             </a:fld>
             <a:endParaRPr lang="en-SG"/>
           </a:p>
@@ -5857,7 +6096,7 @@
           <a:p>
             <a:fld id="{5324BDD3-937A-4E63-80CC-0D9C067336B2}" type="datetimeFigureOut">
               <a:rPr lang="en-SG" smtClean="0"/>
-              <a:t>1/3/2023</a:t>
+              <a:t>2/3/2023</a:t>
             </a:fld>
             <a:endParaRPr lang="en-SG"/>
           </a:p>
@@ -6317,14 +6556,14 @@
           <p:nvPr>
             <p:extLst>
               <p:ext uri="{D42A27DB-BD31-4B8C-83A1-F6EECF244321}">
-                <p14:modId xmlns:p14="http://schemas.microsoft.com/office/powerpoint/2010/main" val="372655099"/>
+                <p14:modId xmlns:p14="http://schemas.microsoft.com/office/powerpoint/2010/main" val="1353171796"/>
               </p:ext>
             </p:extLst>
           </p:nvPr>
         </p:nvGraphicFramePr>
         <p:xfrm>
-          <a:off x="2032000" y="719666"/>
-          <a:ext cx="8128000" cy="5418667"/>
+          <a:off x="707570" y="-76200"/>
+          <a:ext cx="11484429" cy="6564086"/>
         </p:xfrm>
         <a:graphic>
           <a:graphicData uri="http://schemas.openxmlformats.org/drawingml/2006/diagram">

</xml_diff>